<commit_message>
Now checks for updates
</commit_message>
<xml_diff>
--- a/Envelopes Design Files/Envelopes Design.pptx
+++ b/Envelopes Design Files/Envelopes Design.pptx
@@ -198,7 +198,7 @@
           <a:p>
             <a:fld id="{A38002C8-18D3-E849-ACFD-241DC1D9B6FE}" type="datetimeFigureOut">
               <a:rPr lang="en-US" smtClean="0"/>
-              <a:t>2/24/18</a:t>
+              <a:t>3/4/18</a:t>
             </a:fld>
             <a:endParaRPr lang="en-US"/>
           </a:p>
@@ -596,7 +596,7 @@
           <a:p>
             <a:fld id="{2AAEFFBB-F3E6-4916-845F-D300A13452E4}" type="datetimeFigureOut">
               <a:rPr lang="en-US" smtClean="0"/>
-              <a:t>2/24/18</a:t>
+              <a:t>3/4/18</a:t>
             </a:fld>
             <a:endParaRPr lang="en-US"/>
           </a:p>
@@ -761,7 +761,7 @@
           <a:p>
             <a:fld id="{2AAEFFBB-F3E6-4916-845F-D300A13452E4}" type="datetimeFigureOut">
               <a:rPr lang="en-US" smtClean="0"/>
-              <a:t>2/24/18</a:t>
+              <a:t>3/4/18</a:t>
             </a:fld>
             <a:endParaRPr lang="en-US"/>
           </a:p>
@@ -936,7 +936,7 @@
           <a:p>
             <a:fld id="{2AAEFFBB-F3E6-4916-845F-D300A13452E4}" type="datetimeFigureOut">
               <a:rPr lang="en-US" smtClean="0"/>
-              <a:t>2/24/18</a:t>
+              <a:t>3/4/18</a:t>
             </a:fld>
             <a:endParaRPr lang="en-US"/>
           </a:p>
@@ -1101,7 +1101,7 @@
           <a:p>
             <a:fld id="{2AAEFFBB-F3E6-4916-845F-D300A13452E4}" type="datetimeFigureOut">
               <a:rPr lang="en-US" smtClean="0"/>
-              <a:t>2/24/18</a:t>
+              <a:t>3/4/18</a:t>
             </a:fld>
             <a:endParaRPr lang="en-US"/>
           </a:p>
@@ -1340,7 +1340,7 @@
           <a:p>
             <a:fld id="{2AAEFFBB-F3E6-4916-845F-D300A13452E4}" type="datetimeFigureOut">
               <a:rPr lang="en-US" smtClean="0"/>
-              <a:t>2/24/18</a:t>
+              <a:t>3/4/18</a:t>
             </a:fld>
             <a:endParaRPr lang="en-US"/>
           </a:p>
@@ -1567,7 +1567,7 @@
           <a:p>
             <a:fld id="{2AAEFFBB-F3E6-4916-845F-D300A13452E4}" type="datetimeFigureOut">
               <a:rPr lang="en-US" smtClean="0"/>
-              <a:t>2/24/18</a:t>
+              <a:t>3/4/18</a:t>
             </a:fld>
             <a:endParaRPr lang="en-US"/>
           </a:p>
@@ -1929,7 +1929,7 @@
           <a:p>
             <a:fld id="{2AAEFFBB-F3E6-4916-845F-D300A13452E4}" type="datetimeFigureOut">
               <a:rPr lang="en-US" smtClean="0"/>
-              <a:t>2/24/18</a:t>
+              <a:t>3/4/18</a:t>
             </a:fld>
             <a:endParaRPr lang="en-US"/>
           </a:p>
@@ -2042,7 +2042,7 @@
           <a:p>
             <a:fld id="{2AAEFFBB-F3E6-4916-845F-D300A13452E4}" type="datetimeFigureOut">
               <a:rPr lang="en-US" smtClean="0"/>
-              <a:t>2/24/18</a:t>
+              <a:t>3/4/18</a:t>
             </a:fld>
             <a:endParaRPr lang="en-US"/>
           </a:p>
@@ -2132,7 +2132,7 @@
           <a:p>
             <a:fld id="{2AAEFFBB-F3E6-4916-845F-D300A13452E4}" type="datetimeFigureOut">
               <a:rPr lang="en-US" smtClean="0"/>
-              <a:t>2/24/18</a:t>
+              <a:t>3/4/18</a:t>
             </a:fld>
             <a:endParaRPr lang="en-US"/>
           </a:p>
@@ -2404,7 +2404,7 @@
           <a:p>
             <a:fld id="{2AAEFFBB-F3E6-4916-845F-D300A13452E4}" type="datetimeFigureOut">
               <a:rPr lang="en-US" smtClean="0"/>
-              <a:t>2/24/18</a:t>
+              <a:t>3/4/18</a:t>
             </a:fld>
             <a:endParaRPr lang="en-US"/>
           </a:p>
@@ -2656,7 +2656,7 @@
           <a:p>
             <a:fld id="{2AAEFFBB-F3E6-4916-845F-D300A13452E4}" type="datetimeFigureOut">
               <a:rPr lang="en-US" smtClean="0"/>
-              <a:t>2/24/18</a:t>
+              <a:t>3/4/18</a:t>
             </a:fld>
             <a:endParaRPr lang="en-US"/>
           </a:p>
@@ -2864,7 +2864,7 @@
           <a:p>
             <a:fld id="{2AAEFFBB-F3E6-4916-845F-D300A13452E4}" type="datetimeFigureOut">
               <a:rPr lang="en-US" smtClean="0"/>
-              <a:t>2/24/18</a:t>
+              <a:t>3/4/18</a:t>
             </a:fld>
             <a:endParaRPr lang="en-US"/>
           </a:p>
@@ -6126,6 +6126,116 @@
           </a:fontRef>
         </p:style>
       </p:cxnSp>
+      <p:grpSp>
+        <p:nvGrpSpPr>
+          <p:cNvPr id="84" name="Group 83">
+            <a:extLst>
+              <a:ext uri="{FF2B5EF4-FFF2-40B4-BE49-F238E27FC236}">
+                <a16:creationId xmlns:a16="http://schemas.microsoft.com/office/drawing/2014/main" id="{8517BA87-78B7-294E-A627-E7CAD3A698AD}"/>
+              </a:ext>
+            </a:extLst>
+          </p:cNvPr>
+          <p:cNvGrpSpPr/>
+          <p:nvPr/>
+        </p:nvGrpSpPr>
+        <p:grpSpPr>
+          <a:xfrm>
+            <a:off x="7953818" y="2676110"/>
+            <a:ext cx="1000017" cy="600506"/>
+            <a:chOff x="750274" y="609600"/>
+            <a:chExt cx="2637695" cy="529860"/>
+          </a:xfrm>
+        </p:grpSpPr>
+        <p:sp>
+          <p:nvSpPr>
+            <p:cNvPr id="85" name="TextBox 84">
+              <a:extLst>
+                <a:ext uri="{FF2B5EF4-FFF2-40B4-BE49-F238E27FC236}">
+                  <a16:creationId xmlns:a16="http://schemas.microsoft.com/office/drawing/2014/main" id="{B2DA78ED-0A21-1543-912F-017B31BC820F}"/>
+                </a:ext>
+              </a:extLst>
+            </p:cNvPr>
+            <p:cNvSpPr txBox="1"/>
+            <p:nvPr/>
+          </p:nvSpPr>
+          <p:spPr>
+            <a:xfrm>
+              <a:off x="750277" y="609600"/>
+              <a:ext cx="2637692" cy="204638"/>
+            </a:xfrm>
+            <a:prstGeom prst="rect">
+              <a:avLst/>
+            </a:prstGeom>
+            <a:noFill/>
+            <a:ln>
+              <a:solidFill>
+                <a:schemeClr val="tx1"/>
+              </a:solidFill>
+            </a:ln>
+          </p:spPr>
+          <p:txBody>
+            <a:bodyPr wrap="square" rtlCol="0">
+              <a:spAutoFit/>
+            </a:bodyPr>
+            <a:lstStyle/>
+            <a:p>
+              <a:pPr algn="ctr"/>
+              <a:r>
+                <a:rPr lang="en-US" sz="907" b="1" dirty="0"/>
+                <a:t>Version</a:t>
+              </a:r>
+            </a:p>
+          </p:txBody>
+        </p:sp>
+        <p:sp>
+          <p:nvSpPr>
+            <p:cNvPr id="86" name="TextBox 85">
+              <a:extLst>
+                <a:ext uri="{FF2B5EF4-FFF2-40B4-BE49-F238E27FC236}">
+                  <a16:creationId xmlns:a16="http://schemas.microsoft.com/office/drawing/2014/main" id="{7B120E82-FD49-9E40-AA10-C850B316CAAB}"/>
+                </a:ext>
+              </a:extLst>
+            </p:cNvPr>
+            <p:cNvSpPr txBox="1"/>
+            <p:nvPr/>
+          </p:nvSpPr>
+          <p:spPr>
+            <a:xfrm>
+              <a:off x="750274" y="811654"/>
+              <a:ext cx="2637692" cy="327806"/>
+            </a:xfrm>
+            <a:prstGeom prst="rect">
+              <a:avLst/>
+            </a:prstGeom>
+            <a:noFill/>
+            <a:ln>
+              <a:solidFill>
+                <a:schemeClr val="tx1"/>
+              </a:solidFill>
+            </a:ln>
+          </p:spPr>
+          <p:txBody>
+            <a:bodyPr wrap="square" rtlCol="0">
+              <a:spAutoFit/>
+            </a:bodyPr>
+            <a:lstStyle/>
+            <a:p>
+              <a:r>
+                <a:rPr lang="en-US" sz="907" dirty="0" err="1"/>
+                <a:t>id:int</a:t>
+              </a:r>
+              <a:endParaRPr lang="en-US" sz="907" dirty="0"/>
+            </a:p>
+            <a:p>
+              <a:r>
+                <a:rPr lang="en-US" sz="907" dirty="0" err="1"/>
+                <a:t>date:String</a:t>
+              </a:r>
+              <a:endParaRPr lang="en-US" sz="907" dirty="0"/>
+            </a:p>
+          </p:txBody>
+        </p:sp>
+      </p:grpSp>
     </p:spTree>
     <p:extLst>
       <p:ext uri="{BB962C8B-B14F-4D97-AF65-F5344CB8AC3E}">

</xml_diff>